<commit_message>
<Add> Ajout 05- TS
</commit_message>
<xml_diff>
--- a/04- POO/Programmation Orienté Objet1.pptx
+++ b/04- POO/Programmation Orienté Objet1.pptx
@@ -3508,7 +3508,7 @@
           <a:p>
             <a:fld id="{1FBC3E01-91FE-4073-A5BB-579B48A5AFAD}" type="datetimeFigureOut">
               <a:rPr lang="fr-FR" smtClean="0"/>
-              <a:t>10/10/2022</a:t>
+              <a:t>11/10/2022</a:t>
             </a:fld>
             <a:endParaRPr lang="fr-FR"/>
           </a:p>
@@ -3685,7 +3685,7 @@
           <a:p>
             <a:fld id="{27146205-5F6C-4378-A353-694829A09DB2}" type="datetimeFigureOut">
               <a:rPr lang="fr-FR" smtClean="0"/>
-              <a:t>10/10/2022</a:t>
+              <a:t>11/10/2022</a:t>
             </a:fld>
             <a:endParaRPr lang="fr-FR"/>
           </a:p>
@@ -4139,7 +4139,7 @@
             <a:fld id="{B61BEF0D-F0BB-DE4B-95CE-6DB70DBA9567}" type="datetimeFigureOut">
               <a:rPr lang="en-US" smtClean="0"/>
               <a:pPr/>
-              <a:t>10/10/2022</a:t>
+              <a:t>10/11/2022</a:t>
             </a:fld>
             <a:endParaRPr lang="en-US" dirty="0"/>
           </a:p>
@@ -4416,7 +4416,7 @@
             <a:fld id="{B61BEF0D-F0BB-DE4B-95CE-6DB70DBA9567}" type="datetimeFigureOut">
               <a:rPr lang="en-US" smtClean="0"/>
               <a:pPr/>
-              <a:t>10/10/2022</a:t>
+              <a:t>10/11/2022</a:t>
             </a:fld>
             <a:endParaRPr lang="en-US" dirty="0"/>
           </a:p>
@@ -4612,7 +4612,7 @@
             <a:fld id="{B61BEF0D-F0BB-DE4B-95CE-6DB70DBA9567}" type="datetimeFigureOut">
               <a:rPr lang="en-US" smtClean="0"/>
               <a:pPr/>
-              <a:t>10/10/2022</a:t>
+              <a:t>10/11/2022</a:t>
             </a:fld>
             <a:endParaRPr lang="en-US" dirty="0"/>
           </a:p>
@@ -4887,7 +4887,7 @@
             <a:fld id="{B61BEF0D-F0BB-DE4B-95CE-6DB70DBA9567}" type="datetimeFigureOut">
               <a:rPr lang="en-US" smtClean="0"/>
               <a:pPr/>
-              <a:t>10/10/2022</a:t>
+              <a:t>10/11/2022</a:t>
             </a:fld>
             <a:endParaRPr lang="en-US" dirty="0"/>
           </a:p>
@@ -5230,7 +5230,7 @@
             <a:fld id="{B61BEF0D-F0BB-DE4B-95CE-6DB70DBA9567}" type="datetimeFigureOut">
               <a:rPr lang="en-US" smtClean="0"/>
               <a:pPr/>
-              <a:t>10/10/2022</a:t>
+              <a:t>10/11/2022</a:t>
             </a:fld>
             <a:endParaRPr lang="en-US" dirty="0"/>
           </a:p>
@@ -5855,7 +5855,7 @@
             <a:fld id="{B61BEF0D-F0BB-DE4B-95CE-6DB70DBA9567}" type="datetimeFigureOut">
               <a:rPr lang="en-US" smtClean="0"/>
               <a:pPr/>
-              <a:t>10/10/2022</a:t>
+              <a:t>10/11/2022</a:t>
             </a:fld>
             <a:endParaRPr lang="en-US" dirty="0"/>
           </a:p>
@@ -6717,7 +6717,7 @@
             <a:fld id="{B61BEF0D-F0BB-DE4B-95CE-6DB70DBA9567}" type="datetimeFigureOut">
               <a:rPr lang="en-US" smtClean="0"/>
               <a:pPr/>
-              <a:t>10/10/2022</a:t>
+              <a:t>10/11/2022</a:t>
             </a:fld>
             <a:endParaRPr lang="en-US" dirty="0"/>
           </a:p>
@@ -6889,7 +6889,7 @@
             <a:fld id="{B61BEF0D-F0BB-DE4B-95CE-6DB70DBA9567}" type="datetimeFigureOut">
               <a:rPr lang="en-US" smtClean="0"/>
               <a:pPr/>
-              <a:t>10/10/2022</a:t>
+              <a:t>10/11/2022</a:t>
             </a:fld>
             <a:endParaRPr lang="en-US" dirty="0"/>
           </a:p>
@@ -7071,7 +7071,7 @@
             <a:fld id="{B61BEF0D-F0BB-DE4B-95CE-6DB70DBA9567}" type="datetimeFigureOut">
               <a:rPr lang="en-US" smtClean="0"/>
               <a:pPr/>
-              <a:t>10/10/2022</a:t>
+              <a:t>10/11/2022</a:t>
             </a:fld>
             <a:endParaRPr lang="en-US" dirty="0"/>
           </a:p>
@@ -8416,7 +8416,7 @@
                 <a16:creationId xmlns:a16="http://schemas.microsoft.com/office/drawing/2014/main" id="{504C3D61-DE27-4199-80F1-0A07031D08DF}"/>
               </a:ext>
               <a:ext uri="{C183D7F6-B498-43B3-948B-1728B52AA6E4}">
-                <adec:decorative xmlns:adec="http://schemas.microsoft.com/office/drawing/2017/decorative" val="1"/>
+                <adec:decorative xmlns:adec="http://schemas.microsoft.com/office/drawing/2017/decorative" xmlns="" val="1"/>
               </a:ext>
             </a:extLst>
           </p:cNvPr>
@@ -8835,7 +8835,7 @@
                 <a16:creationId xmlns:a16="http://schemas.microsoft.com/office/drawing/2014/main" id="{BCF9D96E-A8E6-4052-A7A9-944C921383B5}"/>
               </a:ext>
               <a:ext uri="{C183D7F6-B498-43B3-948B-1728B52AA6E4}">
-                <adec:decorative xmlns:adec="http://schemas.microsoft.com/office/drawing/2017/decorative" val="1"/>
+                <adec:decorative xmlns:adec="http://schemas.microsoft.com/office/drawing/2017/decorative" xmlns="" val="1"/>
               </a:ext>
             </a:extLst>
           </p:cNvPr>
@@ -8882,7 +8882,7 @@
                 <a16:creationId xmlns:a16="http://schemas.microsoft.com/office/drawing/2014/main" id="{8FD98FA0-8887-4A84-87F2-3F1F46F60C7E}"/>
               </a:ext>
               <a:ext uri="{C183D7F6-B498-43B3-948B-1728B52AA6E4}">
-                <adec:decorative xmlns:adec="http://schemas.microsoft.com/office/drawing/2017/decorative" val="1"/>
+                <adec:decorative xmlns:adec="http://schemas.microsoft.com/office/drawing/2017/decorative" xmlns="" val="1"/>
               </a:ext>
             </a:extLst>
           </p:cNvPr>
@@ -9195,7 +9195,7 @@
                 <a16:creationId xmlns:a16="http://schemas.microsoft.com/office/drawing/2014/main" id="{55DA462C-736B-4143-A47F-DDD0FF073200}"/>
               </a:ext>
               <a:ext uri="{C183D7F6-B498-43B3-948B-1728B52AA6E4}">
-                <adec:decorative xmlns:adec="http://schemas.microsoft.com/office/drawing/2017/decorative" val="1"/>
+                <adec:decorative xmlns:adec="http://schemas.microsoft.com/office/drawing/2017/decorative" xmlns="" val="1"/>
               </a:ext>
             </a:extLst>
           </p:cNvPr>
@@ -9452,7 +9452,7 @@
             <a:fld id="{B61BEF0D-F0BB-DE4B-95CE-6DB70DBA9567}" type="datetimeFigureOut">
               <a:rPr lang="en-US" smtClean="0"/>
               <a:pPr/>
-              <a:t>10/10/2022</a:t>
+              <a:t>10/11/2022</a:t>
             </a:fld>
             <a:endParaRPr lang="en-US" dirty="0"/>
           </a:p>
@@ -9539,7 +9539,7 @@
                 <a16:creationId xmlns:a16="http://schemas.microsoft.com/office/drawing/2014/main" id="{504C3D61-DE27-4199-80F1-0A07031D08DF}"/>
               </a:ext>
               <a:ext uri="{C183D7F6-B498-43B3-948B-1728B52AA6E4}">
-                <adec:decorative xmlns:adec="http://schemas.microsoft.com/office/drawing/2017/decorative" val="1"/>
+                <adec:decorative xmlns:adec="http://schemas.microsoft.com/office/drawing/2017/decorative" xmlns="" val="1"/>
               </a:ext>
             </a:extLst>
           </p:cNvPr>
@@ -9958,7 +9958,7 @@
                 <a16:creationId xmlns:a16="http://schemas.microsoft.com/office/drawing/2014/main" id="{BCF9D96E-A8E6-4052-A7A9-944C921383B5}"/>
               </a:ext>
               <a:ext uri="{C183D7F6-B498-43B3-948B-1728B52AA6E4}">
-                <adec:decorative xmlns:adec="http://schemas.microsoft.com/office/drawing/2017/decorative" val="1"/>
+                <adec:decorative xmlns:adec="http://schemas.microsoft.com/office/drawing/2017/decorative" xmlns="" val="1"/>
               </a:ext>
             </a:extLst>
           </p:cNvPr>
@@ -10005,7 +10005,7 @@
                 <a16:creationId xmlns:a16="http://schemas.microsoft.com/office/drawing/2014/main" id="{8FD98FA0-8887-4A84-87F2-3F1F46F60C7E}"/>
               </a:ext>
               <a:ext uri="{C183D7F6-B498-43B3-948B-1728B52AA6E4}">
-                <adec:decorative xmlns:adec="http://schemas.microsoft.com/office/drawing/2017/decorative" val="1"/>
+                <adec:decorative xmlns:adec="http://schemas.microsoft.com/office/drawing/2017/decorative" xmlns="" val="1"/>
               </a:ext>
             </a:extLst>
           </p:cNvPr>
@@ -10329,7 +10329,7 @@
                 <a16:creationId xmlns:a16="http://schemas.microsoft.com/office/drawing/2014/main" id="{55DA462C-736B-4143-A47F-DDD0FF073200}"/>
               </a:ext>
               <a:ext uri="{C183D7F6-B498-43B3-948B-1728B52AA6E4}">
-                <adec:decorative xmlns:adec="http://schemas.microsoft.com/office/drawing/2017/decorative" val="1"/>
+                <adec:decorative xmlns:adec="http://schemas.microsoft.com/office/drawing/2017/decorative" xmlns="" val="1"/>
               </a:ext>
             </a:extLst>
           </p:cNvPr>
@@ -10767,7 +10767,7 @@
             <a:fld id="{B61BEF0D-F0BB-DE4B-95CE-6DB70DBA9567}" type="datetimeFigureOut">
               <a:rPr lang="en-US" smtClean="0"/>
               <a:pPr/>
-              <a:t>10/10/2022</a:t>
+              <a:t>10/11/2022</a:t>
             </a:fld>
             <a:endParaRPr lang="en-US" dirty="0"/>
           </a:p>
@@ -11061,7 +11061,7 @@
             <a:fld id="{B61BEF0D-F0BB-DE4B-95CE-6DB70DBA9567}" type="datetimeFigureOut">
               <a:rPr lang="en-US" smtClean="0"/>
               <a:pPr/>
-              <a:t>10/10/2022</a:t>
+              <a:t>10/11/2022</a:t>
             </a:fld>
             <a:endParaRPr lang="en-US" dirty="0"/>
           </a:p>
@@ -11507,7 +11507,7 @@
             <a:fld id="{B61BEF0D-F0BB-DE4B-95CE-6DB70DBA9567}" type="datetimeFigureOut">
               <a:rPr lang="en-US" smtClean="0"/>
               <a:pPr/>
-              <a:t>10/10/2022</a:t>
+              <a:t>10/11/2022</a:t>
             </a:fld>
             <a:endParaRPr lang="en-US" dirty="0"/>
           </a:p>
@@ -11627,7 +11627,7 @@
             <a:fld id="{B61BEF0D-F0BB-DE4B-95CE-6DB70DBA9567}" type="datetimeFigureOut">
               <a:rPr lang="en-US" smtClean="0"/>
               <a:pPr/>
-              <a:t>10/10/2022</a:t>
+              <a:t>10/11/2022</a:t>
             </a:fld>
             <a:endParaRPr lang="en-US" dirty="0"/>
           </a:p>
@@ -11724,7 +11724,7 @@
             <a:fld id="{B61BEF0D-F0BB-DE4B-95CE-6DB70DBA9567}" type="datetimeFigureOut">
               <a:rPr lang="en-US" smtClean="0"/>
               <a:pPr/>
-              <a:t>10/10/2022</a:t>
+              <a:t>10/11/2022</a:t>
             </a:fld>
             <a:endParaRPr lang="en-US" dirty="0"/>
           </a:p>
@@ -12005,7 +12005,7 @@
             <a:fld id="{B61BEF0D-F0BB-DE4B-95CE-6DB70DBA9567}" type="datetimeFigureOut">
               <a:rPr lang="en-US" smtClean="0"/>
               <a:pPr/>
-              <a:t>10/10/2022</a:t>
+              <a:t>10/11/2022</a:t>
             </a:fld>
             <a:endParaRPr lang="en-US" dirty="0"/>
           </a:p>
@@ -12282,7 +12282,7 @@
             <a:fld id="{B61BEF0D-F0BB-DE4B-95CE-6DB70DBA9567}" type="datetimeFigureOut">
               <a:rPr lang="en-US" smtClean="0"/>
               <a:pPr/>
-              <a:t>10/10/2022</a:t>
+              <a:t>10/11/2022</a:t>
             </a:fld>
             <a:endParaRPr lang="en-US" dirty="0"/>
           </a:p>
@@ -12713,7 +12713,7 @@
             <a:fld id="{B61BEF0D-F0BB-DE4B-95CE-6DB70DBA9567}" type="datetimeFigureOut">
               <a:rPr lang="en-US" smtClean="0"/>
               <a:pPr/>
-              <a:t>10/10/2022</a:t>
+              <a:t>10/11/2022</a:t>
             </a:fld>
             <a:endParaRPr lang="en-US" dirty="0"/>
           </a:p>
@@ -20284,11 +20284,11 @@
             </a:r>
             <a:r>
               <a:rPr lang="en-US" altLang="fr-FR" dirty="0"/>
-              <a:t> d’un </a:t>
+              <a:t> d’un objet </a:t>
             </a:r>
             <a:r>
               <a:rPr lang="en-US" altLang="fr-FR" dirty="0" err="1"/>
-              <a:t>objet</a:t>
+              <a:t>composé</a:t>
             </a:r>
             <a:r>
               <a:rPr lang="en-US" altLang="fr-FR" dirty="0"/>
@@ -20296,7 +20296,7 @@
             </a:r>
             <a:r>
               <a:rPr lang="en-US" altLang="fr-FR" dirty="0" err="1"/>
-              <a:t>composé</a:t>
+              <a:t>instancié</a:t>
             </a:r>
             <a:r>
               <a:rPr lang="en-US" altLang="fr-FR" dirty="0"/>
@@ -20304,27 +20304,27 @@
             </a:r>
             <a:r>
               <a:rPr lang="en-US" altLang="fr-FR" dirty="0" err="1"/>
-              <a:t>instancié</a:t>
+              <a:t>ainsi</a:t>
             </a:r>
             <a:r>
               <a:rPr lang="en-US" altLang="fr-FR" dirty="0"/>
               <a:t> </a:t>
             </a:r>
             <a:r>
-              <a:rPr lang="en-US" altLang="fr-FR" dirty="0" err="1"/>
-              <a:t>ainsi</a:t>
+              <a:rPr lang="en-US" altLang="fr-FR" dirty="0" smtClean="0"/>
+              <a:t>que </a:t>
+            </a:r>
+            <a:r>
+              <a:rPr lang="en-US" altLang="fr-FR" dirty="0" err="1" smtClean="0"/>
+              <a:t>tous</a:t>
+            </a:r>
+            <a:r>
+              <a:rPr lang="en-US" altLang="fr-FR" dirty="0" smtClean="0"/>
+              <a:t> </a:t>
             </a:r>
             <a:r>
               <a:rPr lang="en-US" altLang="fr-FR" dirty="0"/>
-              <a:t> </a:t>
-            </a:r>
-            <a:r>
-              <a:rPr lang="en-US" altLang="fr-FR" dirty="0" err="1"/>
-              <a:t>tous</a:t>
-            </a:r>
-            <a:r>
-              <a:rPr lang="en-US" altLang="fr-FR" dirty="0"/>
-              <a:t> les </a:t>
+              <a:t>les </a:t>
             </a:r>
             <a:r>
               <a:rPr lang="en-US" altLang="fr-FR" dirty="0" err="1"/>
@@ -32054,15 +32054,6 @@
 </file>
 
 <file path=customXml/item1.xml><?xml version="1.0" encoding="utf-8"?>
-<?mso-contentType ?>
-<FormTemplates xmlns="http://schemas.microsoft.com/sharepoint/v3/contenttype/forms">
-  <Display>DocumentLibraryForm</Display>
-  <Edit>DocumentLibraryForm</Edit>
-  <New>DocumentLibraryForm</New>
-</FormTemplates>
-</file>
-
-<file path=customXml/item2.xml><?xml version="1.0" encoding="utf-8"?>
 <ct:contentTypeSchema xmlns:ct="http://schemas.microsoft.com/office/2006/metadata/contentType" xmlns:ma="http://schemas.microsoft.com/office/2006/metadata/properties/metaAttributes" ct:_="" ma:_="" ma:contentTypeName="Document" ma:contentTypeID="0x010100BEB604C28311E44494E598F4C876ACB7" ma:contentTypeVersion="7" ma:contentTypeDescription="Crée un document." ma:contentTypeScope="" ma:versionID="84f2d84326ade83e67ec3be1b5541fbe">
   <xsd:schema xmlns:xsd="http://www.w3.org/2001/XMLSchema" xmlns:xs="http://www.w3.org/2001/XMLSchema" xmlns:p="http://schemas.microsoft.com/office/2006/metadata/properties" xmlns:ns2="a0ff54e1-a636-46f6-9b69-8f3822d67a0e" xmlns:ns3="8d2c9915-5c45-4ad6-a671-8c5c261169ac" targetNamespace="http://schemas.microsoft.com/office/2006/metadata/properties" ma:root="true" ma:fieldsID="9215c50c2145a4592a4cfe68f9ede7e9" ns2:_="" ns3:_="">
     <xsd:import namespace="a0ff54e1-a636-46f6-9b69-8f3822d67a0e"/>
@@ -32231,6 +32222,15 @@
 </ct:contentTypeSchema>
 </file>
 
+<file path=customXml/item2.xml><?xml version="1.0" encoding="utf-8"?>
+<?mso-contentType ?>
+<FormTemplates xmlns="http://schemas.microsoft.com/sharepoint/v3/contenttype/forms">
+  <Display>DocumentLibraryForm</Display>
+  <Edit>DocumentLibraryForm</Edit>
+  <New>DocumentLibraryForm</New>
+</FormTemplates>
+</file>
+
 <file path=customXml/item3.xml><?xml version="1.0" encoding="utf-8"?>
 <p:properties xmlns:p="http://schemas.microsoft.com/office/2006/metadata/properties" xmlns:xsi="http://www.w3.org/2001/XMLSchema-instance" xmlns:pc="http://schemas.microsoft.com/office/infopath/2007/PartnerControls">
   <documentManagement>
@@ -32243,15 +32243,30 @@
 </file>
 
 <file path=customXml/itemProps1.xml><?xml version="1.0" encoding="utf-8"?>
+<ds:datastoreItem xmlns:ds="http://schemas.openxmlformats.org/officeDocument/2006/customXml" ds:itemID="{9EC79C4E-43C8-48DF-ADDD-2A86710BC08D}">
+  <ds:schemaRefs>
+    <ds:schemaRef ds:uri="http://schemas.microsoft.com/office/2006/metadata/contentType"/>
+    <ds:schemaRef ds:uri="http://schemas.microsoft.com/office/2006/metadata/properties/metaAttributes"/>
+    <ds:schemaRef ds:uri="http://www.w3.org/2001/XMLSchema"/>
+    <ds:schemaRef ds:uri="http://schemas.microsoft.com/office/2006/metadata/properties"/>
+    <ds:schemaRef ds:uri="a0ff54e1-a636-46f6-9b69-8f3822d67a0e"/>
+    <ds:schemaRef ds:uri="8d2c9915-5c45-4ad6-a671-8c5c261169ac"/>
+    <ds:schemaRef ds:uri="http://schemas.microsoft.com/office/2006/documentManagement/types"/>
+    <ds:schemaRef ds:uri="http://schemas.microsoft.com/office/infopath/2007/PartnerControls"/>
+    <ds:schemaRef ds:uri="http://schemas.openxmlformats.org/package/2006/metadata/core-properties"/>
+    <ds:schemaRef ds:uri="http://purl.org/dc/elements/1.1/"/>
+    <ds:schemaRef ds:uri="http://purl.org/dc/terms/"/>
+    <ds:schemaRef ds:uri="http://schemas.microsoft.com/internal/obd"/>
+  </ds:schemaRefs>
+</ds:datastoreItem>
+</file>
+
+<file path=customXml/itemProps2.xml><?xml version="1.0" encoding="utf-8"?>
 <ds:datastoreItem xmlns:ds="http://schemas.openxmlformats.org/officeDocument/2006/customXml" ds:itemID="{A457491F-74C7-40B8-B5D6-E12BE2279CB7}">
   <ds:schemaRefs>
     <ds:schemaRef ds:uri="http://schemas.microsoft.com/sharepoint/v3/contenttype/forms"/>
   </ds:schemaRefs>
 </ds:datastoreItem>
-</file>
-
-<file path=customXml/itemProps2.xml><?xml version="1.0" encoding="utf-8"?>
-<ds:datastoreItem xmlns:ds="http://schemas.openxmlformats.org/officeDocument/2006/customXml" ds:itemID="{9EC79C4E-43C8-48DF-ADDD-2A86710BC08D}"/>
 </file>
 
 <file path=customXml/itemProps3.xml><?xml version="1.0" encoding="utf-8"?>
@@ -32261,6 +32276,8 @@
     <ds:schemaRef ds:uri="http://schemas.microsoft.com/office/infopath/2007/PartnerControls"/>
     <ds:schemaRef ds:uri="ff169a4e-b77a-438e-80a4-0800f20f8d95"/>
     <ds:schemaRef ds:uri="e7e3fc82-298b-4121-ac6d-4eb14224b4c0"/>
+    <ds:schemaRef ds:uri="8d2c9915-5c45-4ad6-a671-8c5c261169ac"/>
+    <ds:schemaRef ds:uri="a0ff54e1-a636-46f6-9b69-8f3822d67a0e"/>
   </ds:schemaRefs>
 </ds:datastoreItem>
 </file>
</xml_diff>